<commit_message>
slight modification to CLIScripting Added Capture of Research Data and Analysis Metadata to ProjectOrg
</commit_message>
<xml_diff>
--- a/doc/slides/day2/session2/CLIScripting.pptx
+++ b/doc/slides/day2/session2/CLIScripting.pptx
@@ -5,7 +5,7 @@
     <p:sldMasterId id="2147483648" r:id="rId1"/>
   </p:sldMasterIdLst>
   <p:notesMasterIdLst>
-    <p:notesMasterId r:id="rId18"/>
+    <p:notesMasterId r:id="rId17"/>
   </p:notesMasterIdLst>
   <p:sldIdLst>
     <p:sldId id="256" r:id="rId2"/>
@@ -16,14 +16,13 @@
     <p:sldId id="261" r:id="rId7"/>
     <p:sldId id="259" r:id="rId8"/>
     <p:sldId id="270" r:id="rId9"/>
-    <p:sldId id="272" r:id="rId10"/>
-    <p:sldId id="262" r:id="rId11"/>
-    <p:sldId id="267" r:id="rId12"/>
-    <p:sldId id="265" r:id="rId13"/>
-    <p:sldId id="273" r:id="rId14"/>
-    <p:sldId id="266" r:id="rId15"/>
-    <p:sldId id="269" r:id="rId16"/>
-    <p:sldId id="264" r:id="rId17"/>
+    <p:sldId id="262" r:id="rId10"/>
+    <p:sldId id="267" r:id="rId11"/>
+    <p:sldId id="265" r:id="rId12"/>
+    <p:sldId id="273" r:id="rId13"/>
+    <p:sldId id="266" r:id="rId14"/>
+    <p:sldId id="269" r:id="rId15"/>
+    <p:sldId id="264" r:id="rId16"/>
   </p:sldIdLst>
   <p:sldSz cx="9144000" cy="6858000" type="screen4x3"/>
   <p:notesSz cx="6858000" cy="9144000"/>
@@ -208,7 +207,7 @@
             <a:fld id="{BEBD7BB8-CB0F-3147-8597-AF5DC6013C28}" type="datetimeFigureOut">
               <a:rPr lang="en-US" smtClean="0"/>
               <a:pPr/>
-              <a:t>9/5/12</a:t>
+              <a:t>9/7/12</a:t>
             </a:fld>
             <a:endParaRPr lang="en-US"/>
           </a:p>
@@ -640,7 +639,7 @@
             <a:fld id="{4D83696D-1FDB-3747-BF38-2B83E9AFCFF7}" type="slidenum">
               <a:rPr lang="en-US" smtClean="0"/>
               <a:pPr/>
-              <a:t>16</a:t>
+              <a:t>15</a:t>
             </a:fld>
             <a:endParaRPr lang="en-US"/>
           </a:p>
@@ -836,7 +835,7 @@
             <a:fld id="{49072BD6-7320-8A4C-B5BF-960FC4D05047}" type="datetimeFigureOut">
               <a:rPr lang="en-US" smtClean="0"/>
               <a:pPr/>
-              <a:t>9/5/12</a:t>
+              <a:t>9/7/12</a:t>
             </a:fld>
             <a:endParaRPr lang="en-US"/>
           </a:p>
@@ -1003,7 +1002,7 @@
             <a:fld id="{49072BD6-7320-8A4C-B5BF-960FC4D05047}" type="datetimeFigureOut">
               <a:rPr lang="en-US" smtClean="0"/>
               <a:pPr/>
-              <a:t>9/5/12</a:t>
+              <a:t>9/7/12</a:t>
             </a:fld>
             <a:endParaRPr lang="en-US"/>
           </a:p>
@@ -1180,7 +1179,7 @@
             <a:fld id="{49072BD6-7320-8A4C-B5BF-960FC4D05047}" type="datetimeFigureOut">
               <a:rPr lang="en-US" smtClean="0"/>
               <a:pPr/>
-              <a:t>9/5/12</a:t>
+              <a:t>9/7/12</a:t>
             </a:fld>
             <a:endParaRPr lang="en-US"/>
           </a:p>
@@ -1347,7 +1346,7 @@
             <a:fld id="{49072BD6-7320-8A4C-B5BF-960FC4D05047}" type="datetimeFigureOut">
               <a:rPr lang="en-US" smtClean="0"/>
               <a:pPr/>
-              <a:t>9/5/12</a:t>
+              <a:t>9/7/12</a:t>
             </a:fld>
             <a:endParaRPr lang="en-US"/>
           </a:p>
@@ -1590,7 +1589,7 @@
             <a:fld id="{49072BD6-7320-8A4C-B5BF-960FC4D05047}" type="datetimeFigureOut">
               <a:rPr lang="en-US" smtClean="0"/>
               <a:pPr/>
-              <a:t>9/5/12</a:t>
+              <a:t>9/7/12</a:t>
             </a:fld>
             <a:endParaRPr lang="en-US"/>
           </a:p>
@@ -1875,7 +1874,7 @@
             <a:fld id="{49072BD6-7320-8A4C-B5BF-960FC4D05047}" type="datetimeFigureOut">
               <a:rPr lang="en-US" smtClean="0"/>
               <a:pPr/>
-              <a:t>9/5/12</a:t>
+              <a:t>9/7/12</a:t>
             </a:fld>
             <a:endParaRPr lang="en-US"/>
           </a:p>
@@ -2294,7 +2293,7 @@
             <a:fld id="{49072BD6-7320-8A4C-B5BF-960FC4D05047}" type="datetimeFigureOut">
               <a:rPr lang="en-US" smtClean="0"/>
               <a:pPr/>
-              <a:t>9/5/12</a:t>
+              <a:t>9/7/12</a:t>
             </a:fld>
             <a:endParaRPr lang="en-US"/>
           </a:p>
@@ -2409,7 +2408,7 @@
             <a:fld id="{49072BD6-7320-8A4C-B5BF-960FC4D05047}" type="datetimeFigureOut">
               <a:rPr lang="en-US" smtClean="0"/>
               <a:pPr/>
-              <a:t>9/5/12</a:t>
+              <a:t>9/7/12</a:t>
             </a:fld>
             <a:endParaRPr lang="en-US"/>
           </a:p>
@@ -2501,7 +2500,7 @@
             <a:fld id="{49072BD6-7320-8A4C-B5BF-960FC4D05047}" type="datetimeFigureOut">
               <a:rPr lang="en-US" smtClean="0"/>
               <a:pPr/>
-              <a:t>9/5/12</a:t>
+              <a:t>9/7/12</a:t>
             </a:fld>
             <a:endParaRPr lang="en-US"/>
           </a:p>
@@ -2775,7 +2774,7 @@
             <a:fld id="{49072BD6-7320-8A4C-B5BF-960FC4D05047}" type="datetimeFigureOut">
               <a:rPr lang="en-US" smtClean="0"/>
               <a:pPr/>
-              <a:t>9/5/12</a:t>
+              <a:t>9/7/12</a:t>
             </a:fld>
             <a:endParaRPr lang="en-US"/>
           </a:p>
@@ -3025,7 +3024,7 @@
             <a:fld id="{49072BD6-7320-8A4C-B5BF-960FC4D05047}" type="datetimeFigureOut">
               <a:rPr lang="en-US" smtClean="0"/>
               <a:pPr/>
-              <a:t>9/5/12</a:t>
+              <a:t>9/7/12</a:t>
             </a:fld>
             <a:endParaRPr lang="en-US"/>
           </a:p>
@@ -3235,7 +3234,7 @@
             <a:fld id="{49072BD6-7320-8A4C-B5BF-960FC4D05047}" type="datetimeFigureOut">
               <a:rPr lang="en-US" smtClean="0"/>
               <a:pPr/>
-              <a:t>9/5/12</a:t>
+              <a:t>9/7/12</a:t>
             </a:fld>
             <a:endParaRPr lang="en-US"/>
           </a:p>
@@ -3701,7 +3700,7 @@
           <a:p>
             <a:r>
               <a:rPr lang="en-US" dirty="0" smtClean="0"/>
-              <a:t>Comments</a:t>
+              <a:t>Variables</a:t>
             </a:r>
             <a:endParaRPr lang="en-US" dirty="0"/>
           </a:p>
@@ -3719,35 +3718,69 @@
         </p:nvSpPr>
         <p:spPr/>
         <p:txBody>
-          <a:bodyPr/>
+          <a:bodyPr>
+            <a:normAutofit/>
+          </a:bodyPr>
           <a:lstStyle/>
           <a:p>
             <a:r>
               <a:rPr lang="en-US" dirty="0" smtClean="0"/>
-              <a:t>It is good practice to explain all but the most trivial source code, both to yourself and to others.</a:t>
+              <a:t>As we saw in the UNIX environment, variables are things with a fixed name (e.g. "PATH") and a variable value.</a:t>
             </a:r>
           </a:p>
           <a:p>
             <a:r>
               <a:rPr lang="en-US" dirty="0" smtClean="0"/>
-              <a:t>Comments are the way to explain source code from a developer point of view.</a:t>
-            </a:r>
-          </a:p>
-          <a:p>
-            <a:r>
+              <a:t>Variables can be assigned from simple values (or other variables):</a:t>
+            </a:r>
+            <a:br>
               <a:rPr lang="en-US" dirty="0" smtClean="0"/>
-              <a:t>In shell (and many other) scripting languages, anything followed by </a:t>
-            </a:r>
-            <a:r>
-              <a:rPr lang="en-US" b="1" dirty="0" smtClean="0">
-                <a:latin typeface="Courier New"/>
-                <a:cs typeface="Courier New"/>
-              </a:rPr>
-              <a:t>#</a:t>
-            </a:r>
+            </a:br>
+            <a:r>
+              <a:rPr lang="en-US" sz="2800" dirty="0" smtClean="0">
+                <a:latin typeface="Courier New"/>
+                <a:cs typeface="Courier New"/>
+              </a:rPr>
+              <a:t>$ </a:t>
+            </a:r>
+            <a:r>
+              <a:rPr lang="en-US" sz="2800" dirty="0" err="1" smtClean="0">
+                <a:latin typeface="Courier New"/>
+                <a:cs typeface="Courier New"/>
+              </a:rPr>
+              <a:t>myvar</a:t>
+            </a:r>
+            <a:r>
+              <a:rPr lang="en-US" sz="2800" dirty="0" smtClean="0">
+                <a:latin typeface="Courier New"/>
+                <a:cs typeface="Courier New"/>
+              </a:rPr>
+              <a:t>='Hello World!'; echo $</a:t>
+            </a:r>
+            <a:r>
+              <a:rPr lang="en-US" sz="2800" dirty="0" err="1" smtClean="0">
+                <a:latin typeface="Courier New"/>
+                <a:cs typeface="Courier New"/>
+              </a:rPr>
+              <a:t>myvar</a:t>
+            </a:r>
+            <a:endParaRPr lang="en-US" dirty="0" smtClean="0">
+              <a:latin typeface="Courier New"/>
+              <a:cs typeface="Courier New"/>
+            </a:endParaRPr>
+          </a:p>
+          <a:p>
             <a:r>
               <a:rPr lang="en-US" dirty="0" smtClean="0"/>
-              <a:t> is a comment</a:t>
+              <a:t>Variables can also be assigned from the output of commands, using "</a:t>
+            </a:r>
+            <a:r>
+              <a:rPr lang="en-US" dirty="0" err="1" smtClean="0"/>
+              <a:t>backticks</a:t>
+            </a:r>
+            <a:r>
+              <a:rPr lang="en-US" dirty="0" smtClean="0"/>
+              <a:t>"</a:t>
             </a:r>
             <a:endParaRPr lang="en-US" dirty="0"/>
           </a:p>
@@ -3801,8 +3834,8 @@
           <a:lstStyle/>
           <a:p>
             <a:r>
-              <a:rPr lang="en-US" dirty="0" smtClean="0"/>
-              <a:t>Variables</a:t>
+              <a:rPr lang="en-US" dirty="0" err="1" smtClean="0"/>
+              <a:t>Backticks</a:t>
             </a:r>
             <a:endParaRPr lang="en-US" dirty="0"/>
           </a:p>
@@ -3827,44 +3860,45 @@
           <a:p>
             <a:r>
               <a:rPr lang="en-US" dirty="0" smtClean="0"/>
-              <a:t>As we saw in the UNIX environment, variables are things with a fixed name (e.g. "PATH") and a variable value.</a:t>
-            </a:r>
-          </a:p>
-          <a:p>
-            <a:r>
-              <a:rPr lang="en-US" dirty="0" smtClean="0"/>
-              <a:t>Variables can be assigned from simple values (or other variables):</a:t>
+              <a:t>For example, to assign a file listing to a variable:</a:t>
             </a:r>
             <a:br>
               <a:rPr lang="en-US" dirty="0" smtClean="0"/>
             </a:br>
             <a:r>
-              <a:rPr lang="en-US" sz="2800" dirty="0" smtClean="0">
+              <a:rPr lang="en-US" sz="2400" dirty="0" smtClean="0">
                 <a:latin typeface="Courier New"/>
                 <a:cs typeface="Courier New"/>
               </a:rPr>
               <a:t>$ </a:t>
             </a:r>
             <a:r>
-              <a:rPr lang="en-US" sz="2800" dirty="0" err="1" smtClean="0">
-                <a:latin typeface="Courier New"/>
-                <a:cs typeface="Courier New"/>
-              </a:rPr>
-              <a:t>myvar</a:t>
-            </a:r>
-            <a:r>
-              <a:rPr lang="en-US" sz="2800" dirty="0" smtClean="0">
-                <a:latin typeface="Courier New"/>
-                <a:cs typeface="Courier New"/>
-              </a:rPr>
-              <a:t>='Hello World!'; echo $</a:t>
-            </a:r>
-            <a:r>
-              <a:rPr lang="en-US" sz="2800" dirty="0" err="1" smtClean="0">
-                <a:latin typeface="Courier New"/>
-                <a:cs typeface="Courier New"/>
-              </a:rPr>
-              <a:t>myvar</a:t>
+              <a:rPr lang="en-US" sz="2400" dirty="0" err="1" smtClean="0">
+                <a:latin typeface="Courier New"/>
+                <a:cs typeface="Courier New"/>
+              </a:rPr>
+              <a:t>mylist</a:t>
+            </a:r>
+            <a:r>
+              <a:rPr lang="en-US" sz="2400" dirty="0" smtClean="0">
+                <a:latin typeface="Courier New"/>
+                <a:cs typeface="Courier New"/>
+              </a:rPr>
+              <a:t>=`</a:t>
+            </a:r>
+            <a:r>
+              <a:rPr lang="en-US" sz="2400" dirty="0" err="1" smtClean="0">
+                <a:latin typeface="Courier New"/>
+                <a:cs typeface="Courier New"/>
+              </a:rPr>
+              <a:t>ls</a:t>
+            </a:r>
+            <a:r>
+              <a:rPr lang="en-US" sz="2400" dirty="0" smtClean="0">
+                <a:latin typeface="Courier New"/>
+                <a:cs typeface="Courier New"/>
+              </a:rPr>
+              <a:t>`</a:t>
             </a:r>
             <a:endParaRPr lang="en-US" dirty="0" smtClean="0">
               <a:latin typeface="Courier New"/>
@@ -3874,7 +3908,101 @@
           <a:p>
             <a:r>
               <a:rPr lang="en-US" dirty="0" smtClean="0"/>
-              <a:t>Variables can also be assigned from the output of commands, using "</a:t>
+              <a:t>To assign a list of all text files except for </a:t>
+            </a:r>
+            <a:r>
+              <a:rPr lang="en-US" dirty="0" err="1" smtClean="0"/>
+              <a:t>README.txt</a:t>
+            </a:r>
+            <a:r>
+              <a:rPr lang="en-US" dirty="0" smtClean="0"/>
+              <a:t>:</a:t>
+            </a:r>
+            <a:br>
+              <a:rPr lang="en-US" dirty="0" smtClean="0"/>
+            </a:br>
+            <a:r>
+              <a:rPr lang="en-US" sz="2400" dirty="0" smtClean="0">
+                <a:latin typeface="Courier New"/>
+                <a:cs typeface="Courier New"/>
+              </a:rPr>
+              <a:t>$ </a:t>
+            </a:r>
+            <a:r>
+              <a:rPr lang="en-US" sz="2400" dirty="0" err="1" smtClean="0">
+                <a:latin typeface="Courier New"/>
+                <a:cs typeface="Courier New"/>
+              </a:rPr>
+              <a:t>mytexts</a:t>
+            </a:r>
+            <a:r>
+              <a:rPr lang="en-US" sz="2400" dirty="0" smtClean="0">
+                <a:latin typeface="Courier New"/>
+                <a:cs typeface="Courier New"/>
+              </a:rPr>
+              <a:t>=`</a:t>
+            </a:r>
+            <a:r>
+              <a:rPr lang="en-US" sz="2400" dirty="0" err="1" smtClean="0">
+                <a:latin typeface="Courier New"/>
+                <a:cs typeface="Courier New"/>
+              </a:rPr>
+              <a:t>ls</a:t>
+            </a:r>
+            <a:r>
+              <a:rPr lang="en-US" sz="2400" dirty="0" smtClean="0">
+                <a:latin typeface="Courier New"/>
+                <a:cs typeface="Courier New"/>
+              </a:rPr>
+              <a:t> | </a:t>
+            </a:r>
+            <a:r>
+              <a:rPr lang="en-US" sz="2400" dirty="0" err="1" smtClean="0">
+                <a:latin typeface="Courier New"/>
+                <a:cs typeface="Courier New"/>
+              </a:rPr>
+              <a:t>grep</a:t>
+            </a:r>
+            <a:r>
+              <a:rPr lang="en-US" sz="2400" dirty="0" smtClean="0">
+                <a:latin typeface="Courier New"/>
+                <a:cs typeface="Courier New"/>
+              </a:rPr>
+              <a:t> -</a:t>
+            </a:r>
+            <a:r>
+              <a:rPr lang="en-US" sz="2400" dirty="0" err="1" smtClean="0">
+                <a:latin typeface="Courier New"/>
+                <a:cs typeface="Courier New"/>
+              </a:rPr>
+              <a:t>v</a:t>
+            </a:r>
+            <a:r>
+              <a:rPr lang="en-US" sz="2400" dirty="0" smtClean="0">
+                <a:latin typeface="Courier New"/>
+                <a:cs typeface="Courier New"/>
+              </a:rPr>
+              <a:t> '</a:t>
+            </a:r>
+            <a:r>
+              <a:rPr lang="en-US" sz="2400" dirty="0" err="1" smtClean="0">
+                <a:latin typeface="Courier New"/>
+                <a:cs typeface="Courier New"/>
+              </a:rPr>
+              <a:t>README.txt</a:t>
+            </a:r>
+            <a:r>
+              <a:rPr lang="en-US" sz="2400" dirty="0" smtClean="0">
+                <a:latin typeface="Courier New"/>
+                <a:cs typeface="Courier New"/>
+              </a:rPr>
+              <a:t>'`</a:t>
+            </a:r>
+          </a:p>
+          <a:p>
+            <a:r>
+              <a:rPr lang="en-US" dirty="0" smtClean="0"/>
+              <a:t>In place of `</a:t>
             </a:r>
             <a:r>
               <a:rPr lang="en-US" dirty="0" err="1" smtClean="0"/>
@@ -3882,9 +4010,92 @@
             </a:r>
             <a:r>
               <a:rPr lang="en-US" dirty="0" smtClean="0"/>
-              <a:t>"</a:t>
-            </a:r>
-            <a:endParaRPr lang="en-US" dirty="0"/>
+              <a:t>`, this works also:</a:t>
+            </a:r>
+            <a:br>
+              <a:rPr lang="en-US" dirty="0" smtClean="0"/>
+            </a:br>
+            <a:r>
+              <a:rPr lang="en-US" sz="2400" dirty="0" smtClean="0">
+                <a:latin typeface="Courier New"/>
+                <a:cs typeface="Courier New"/>
+              </a:rPr>
+              <a:t>$ </a:t>
+            </a:r>
+            <a:r>
+              <a:rPr lang="en-US" sz="2400" dirty="0" err="1" smtClean="0">
+                <a:latin typeface="Courier New"/>
+                <a:cs typeface="Courier New"/>
+              </a:rPr>
+              <a:t>mytexts</a:t>
+            </a:r>
+            <a:r>
+              <a:rPr lang="en-US" sz="2400" dirty="0" smtClean="0">
+                <a:latin typeface="Courier New"/>
+                <a:cs typeface="Courier New"/>
+              </a:rPr>
+              <a:t>=$(</a:t>
+            </a:r>
+            <a:r>
+              <a:rPr lang="en-US" sz="2400" dirty="0" err="1" smtClean="0">
+                <a:latin typeface="Courier New"/>
+                <a:cs typeface="Courier New"/>
+              </a:rPr>
+              <a:t>ls</a:t>
+            </a:r>
+            <a:r>
+              <a:rPr lang="en-US" sz="2400" dirty="0" smtClean="0">
+                <a:latin typeface="Courier New"/>
+                <a:cs typeface="Courier New"/>
+              </a:rPr>
+              <a:t> | </a:t>
+            </a:r>
+            <a:r>
+              <a:rPr lang="en-US" sz="2400" dirty="0" err="1" smtClean="0">
+                <a:latin typeface="Courier New"/>
+                <a:cs typeface="Courier New"/>
+              </a:rPr>
+              <a:t>grep</a:t>
+            </a:r>
+            <a:r>
+              <a:rPr lang="en-US" sz="2400" dirty="0" smtClean="0">
+                <a:latin typeface="Courier New"/>
+                <a:cs typeface="Courier New"/>
+              </a:rPr>
+              <a:t> -</a:t>
+            </a:r>
+            <a:r>
+              <a:rPr lang="en-US" sz="2400" dirty="0" err="1" smtClean="0">
+                <a:latin typeface="Courier New"/>
+                <a:cs typeface="Courier New"/>
+              </a:rPr>
+              <a:t>v</a:t>
+            </a:r>
+            <a:r>
+              <a:rPr lang="en-US" sz="2400" dirty="0" smtClean="0">
+                <a:latin typeface="Courier New"/>
+                <a:cs typeface="Courier New"/>
+              </a:rPr>
+              <a:t> '</a:t>
+            </a:r>
+            <a:r>
+              <a:rPr lang="en-US" sz="2400" dirty="0" err="1" smtClean="0">
+                <a:latin typeface="Courier New"/>
+                <a:cs typeface="Courier New"/>
+              </a:rPr>
+              <a:t>README.txt</a:t>
+            </a:r>
+            <a:r>
+              <a:rPr lang="en-US" sz="2400" dirty="0" smtClean="0">
+                <a:latin typeface="Courier New"/>
+                <a:cs typeface="Courier New"/>
+              </a:rPr>
+              <a:t>')</a:t>
+            </a:r>
+            <a:endParaRPr lang="en-US" dirty="0" smtClean="0">
+              <a:latin typeface="Courier New"/>
+              <a:cs typeface="Courier New"/>
+            </a:endParaRPr>
           </a:p>
         </p:txBody>
       </p:sp>
@@ -3936,8 +4147,8 @@
           <a:lstStyle/>
           <a:p>
             <a:r>
-              <a:rPr lang="en-US" dirty="0" err="1" smtClean="0"/>
-              <a:t>Backticks</a:t>
+              <a:rPr lang="en-US" dirty="0" smtClean="0"/>
+              <a:t>Conditionals</a:t>
             </a:r>
             <a:endParaRPr lang="en-US" dirty="0"/>
           </a:p>
@@ -3955,246 +4166,71 @@
         </p:nvSpPr>
         <p:spPr/>
         <p:txBody>
-          <a:bodyPr>
-            <a:normAutofit/>
-          </a:bodyPr>
+          <a:bodyPr/>
           <a:lstStyle/>
           <a:p>
             <a:r>
               <a:rPr lang="en-US" dirty="0" smtClean="0"/>
-              <a:t>For example, to assign a file listing to a variable:</a:t>
+              <a:t>Maybe you need to do something only if a certain condition is true. For example, only create a file if it doesn't exist yet:</a:t>
             </a:r>
             <a:br>
               <a:rPr lang="en-US" dirty="0" smtClean="0"/>
             </a:br>
             <a:r>
-              <a:rPr lang="en-US" sz="2400" dirty="0" smtClean="0">
+              <a:rPr lang="en-US" dirty="0" smtClean="0">
+                <a:latin typeface="Courier New"/>
+                <a:cs typeface="Courier New"/>
+              </a:rPr>
+              <a:t>$ if [ ! -</a:t>
+            </a:r>
+            <a:r>
+              <a:rPr lang="en-US" dirty="0" err="1" smtClean="0">
+                <a:latin typeface="Courier New"/>
+                <a:cs typeface="Courier New"/>
+              </a:rPr>
+              <a:t>e</a:t>
+            </a:r>
+            <a:r>
+              <a:rPr lang="en-US" dirty="0" smtClean="0">
+                <a:latin typeface="Courier New"/>
+                <a:cs typeface="Courier New"/>
+              </a:rPr>
+              <a:t> "filename" ]; then</a:t>
+            </a:r>
+            <a:br>
+              <a:rPr lang="en-US" dirty="0" smtClean="0">
+                <a:latin typeface="Courier New"/>
+                <a:cs typeface="Courier New"/>
+              </a:rPr>
+            </a:br>
+            <a:r>
+              <a:rPr lang="en-US" dirty="0" smtClean="0">
+                <a:latin typeface="Courier New"/>
+                <a:cs typeface="Courier New"/>
+              </a:rPr>
+              <a:t>$ touch filename</a:t>
+            </a:r>
+            <a:br>
+              <a:rPr lang="en-US" dirty="0" smtClean="0">
+                <a:latin typeface="Courier New"/>
+                <a:cs typeface="Courier New"/>
+              </a:rPr>
+            </a:br>
+            <a:r>
+              <a:rPr lang="en-US" dirty="0" smtClean="0">
                 <a:latin typeface="Courier New"/>
                 <a:cs typeface="Courier New"/>
               </a:rPr>
               <a:t>$ </a:t>
             </a:r>
             <a:r>
-              <a:rPr lang="en-US" sz="2400" dirty="0" err="1" smtClean="0">
-                <a:latin typeface="Courier New"/>
-                <a:cs typeface="Courier New"/>
-              </a:rPr>
-              <a:t>mylist</a:t>
-            </a:r>
-            <a:r>
-              <a:rPr lang="en-US" sz="2400" dirty="0" smtClean="0">
-                <a:latin typeface="Courier New"/>
-                <a:cs typeface="Courier New"/>
-              </a:rPr>
-              <a:t>=`</a:t>
-            </a:r>
-            <a:r>
-              <a:rPr lang="en-US" sz="2400" dirty="0" err="1" smtClean="0">
-                <a:latin typeface="Courier New"/>
-                <a:cs typeface="Courier New"/>
-              </a:rPr>
-              <a:t>ls</a:t>
-            </a:r>
-            <a:r>
-              <a:rPr lang="en-US" sz="2400" dirty="0" smtClean="0">
-                <a:latin typeface="Courier New"/>
-                <a:cs typeface="Courier New"/>
-              </a:rPr>
-              <a:t>`</a:t>
-            </a:r>
-            <a:endParaRPr lang="en-US" dirty="0" smtClean="0">
-              <a:latin typeface="Courier New"/>
-              <a:cs typeface="Courier New"/>
-            </a:endParaRPr>
-          </a:p>
-          <a:p>
-            <a:r>
-              <a:rPr lang="en-US" dirty="0" smtClean="0"/>
-              <a:t>To assign a list of all text files except for </a:t>
-            </a:r>
-            <a:r>
-              <a:rPr lang="en-US" dirty="0" err="1" smtClean="0"/>
-              <a:t>README.txt</a:t>
-            </a:r>
-            <a:r>
-              <a:rPr lang="en-US" dirty="0" smtClean="0"/>
-              <a:t>:</a:t>
-            </a:r>
-            <a:br>
-              <a:rPr lang="en-US" dirty="0" smtClean="0"/>
-            </a:br>
-            <a:r>
-              <a:rPr lang="en-US" sz="2400" dirty="0" smtClean="0">
-                <a:latin typeface="Courier New"/>
-                <a:cs typeface="Courier New"/>
-              </a:rPr>
-              <a:t>$ </a:t>
-            </a:r>
-            <a:r>
-              <a:rPr lang="en-US" sz="2400" dirty="0" err="1" smtClean="0">
-                <a:latin typeface="Courier New"/>
-                <a:cs typeface="Courier New"/>
-              </a:rPr>
-              <a:t>mytexts</a:t>
-            </a:r>
-            <a:r>
-              <a:rPr lang="en-US" sz="2400" dirty="0" smtClean="0">
-                <a:latin typeface="Courier New"/>
-                <a:cs typeface="Courier New"/>
-              </a:rPr>
-              <a:t>=`</a:t>
-            </a:r>
-            <a:r>
-              <a:rPr lang="en-US" sz="2400" dirty="0" err="1" smtClean="0">
-                <a:latin typeface="Courier New"/>
-                <a:cs typeface="Courier New"/>
-              </a:rPr>
-              <a:t>ls</a:t>
-            </a:r>
-            <a:r>
-              <a:rPr lang="en-US" sz="2400" dirty="0" smtClean="0">
-                <a:latin typeface="Courier New"/>
-                <a:cs typeface="Courier New"/>
-              </a:rPr>
-              <a:t> | </a:t>
-            </a:r>
-            <a:r>
-              <a:rPr lang="en-US" sz="2400" dirty="0" err="1" smtClean="0">
-                <a:latin typeface="Courier New"/>
-                <a:cs typeface="Courier New"/>
-              </a:rPr>
-              <a:t>grep</a:t>
-            </a:r>
-            <a:r>
-              <a:rPr lang="en-US" sz="2400" dirty="0" smtClean="0">
-                <a:latin typeface="Courier New"/>
-                <a:cs typeface="Courier New"/>
-              </a:rPr>
-              <a:t> -</a:t>
-            </a:r>
-            <a:r>
-              <a:rPr lang="en-US" sz="2400" dirty="0" err="1" smtClean="0">
-                <a:latin typeface="Courier New"/>
-                <a:cs typeface="Courier New"/>
-              </a:rPr>
-              <a:t>v</a:t>
-            </a:r>
-            <a:r>
-              <a:rPr lang="en-US" sz="2400" dirty="0" smtClean="0">
-                <a:latin typeface="Courier New"/>
-                <a:cs typeface="Courier New"/>
-              </a:rPr>
-              <a:t> '</a:t>
-            </a:r>
-            <a:r>
-              <a:rPr lang="en-US" sz="2400" dirty="0" err="1" smtClean="0">
-                <a:latin typeface="Courier New"/>
-                <a:cs typeface="Courier New"/>
-              </a:rPr>
-              <a:t>README.txt</a:t>
-            </a:r>
-            <a:r>
-              <a:rPr lang="en-US" sz="2400" dirty="0" smtClean="0">
-                <a:latin typeface="Courier New"/>
-                <a:cs typeface="Courier New"/>
-              </a:rPr>
-              <a:t>'`</a:t>
-            </a:r>
-          </a:p>
-          <a:p>
-            <a:r>
-              <a:rPr lang="en-US" dirty="0" smtClean="0"/>
-              <a:t>In place of `</a:t>
-            </a:r>
-            <a:r>
-              <a:rPr lang="en-US" dirty="0" err="1" smtClean="0"/>
-              <a:t>backticks</a:t>
-            </a:r>
-            <a:r>
-              <a:rPr lang="en-US" dirty="0" smtClean="0"/>
-              <a:t>`, this works also:</a:t>
-            </a:r>
-            <a:br>
-              <a:rPr lang="en-US" dirty="0" smtClean="0"/>
-            </a:br>
-            <a:r>
-              <a:rPr lang="en-US" sz="2400" dirty="0" smtClean="0">
-                <a:latin typeface="Courier New"/>
-                <a:cs typeface="Courier New"/>
-              </a:rPr>
-              <a:t>$ </a:t>
-            </a:r>
-            <a:r>
-              <a:rPr lang="en-US" sz="2400" dirty="0" err="1" smtClean="0">
-                <a:latin typeface="Courier New"/>
-                <a:cs typeface="Courier New"/>
-              </a:rPr>
-              <a:t>mytexts</a:t>
-            </a:r>
-            <a:r>
-              <a:rPr lang="en-US" sz="2400" dirty="0" smtClean="0">
-                <a:latin typeface="Courier New"/>
-                <a:cs typeface="Courier New"/>
-              </a:rPr>
-              <a:t>=$(</a:t>
-            </a:r>
-            <a:r>
-              <a:rPr lang="en-US" sz="2400" dirty="0" err="1" smtClean="0">
-                <a:latin typeface="Courier New"/>
-                <a:cs typeface="Courier New"/>
-              </a:rPr>
-              <a:t>ls</a:t>
-            </a:r>
-            <a:r>
-              <a:rPr lang="en-US" sz="2400" dirty="0" smtClean="0">
-                <a:latin typeface="Courier New"/>
-                <a:cs typeface="Courier New"/>
-              </a:rPr>
-              <a:t> | </a:t>
-            </a:r>
-            <a:r>
-              <a:rPr lang="en-US" sz="2400" dirty="0" err="1" smtClean="0">
-                <a:latin typeface="Courier New"/>
-                <a:cs typeface="Courier New"/>
-              </a:rPr>
-              <a:t>grep</a:t>
-            </a:r>
-            <a:r>
-              <a:rPr lang="en-US" sz="2400" dirty="0" smtClean="0">
-                <a:latin typeface="Courier New"/>
-                <a:cs typeface="Courier New"/>
-              </a:rPr>
-              <a:t> -</a:t>
-            </a:r>
-            <a:r>
-              <a:rPr lang="en-US" sz="2400" dirty="0" err="1" smtClean="0">
-                <a:latin typeface="Courier New"/>
-                <a:cs typeface="Courier New"/>
-              </a:rPr>
-              <a:t>v</a:t>
-            </a:r>
-            <a:r>
-              <a:rPr lang="en-US" sz="2400" dirty="0" smtClean="0">
-                <a:latin typeface="Courier New"/>
-                <a:cs typeface="Courier New"/>
-              </a:rPr>
-              <a:t> '</a:t>
-            </a:r>
-            <a:r>
-              <a:rPr lang="en-US" sz="2400" dirty="0" err="1" smtClean="0">
-                <a:latin typeface="Courier New"/>
-                <a:cs typeface="Courier New"/>
-              </a:rPr>
-              <a:t>README.txt</a:t>
-            </a:r>
-            <a:r>
-              <a:rPr lang="en-US" sz="2400" dirty="0" smtClean="0">
-                <a:latin typeface="Courier New"/>
-                <a:cs typeface="Courier New"/>
-              </a:rPr>
-              <a:t>')</a:t>
-            </a:r>
-            <a:endParaRPr lang="en-US" dirty="0" smtClean="0">
+              <a:rPr lang="en-US" dirty="0" err="1" smtClean="0">
+                <a:latin typeface="Courier New"/>
+                <a:cs typeface="Courier New"/>
+              </a:rPr>
+              <a:t>fi</a:t>
+            </a:r>
+            <a:endParaRPr lang="en-US" dirty="0">
               <a:latin typeface="Courier New"/>
               <a:cs typeface="Courier New"/>
             </a:endParaRPr>
@@ -4250,7 +4286,7 @@
           <a:p>
             <a:r>
               <a:rPr lang="en-US" dirty="0" smtClean="0"/>
-              <a:t>Conditionals</a:t>
+              <a:t>Loops</a:t>
             </a:r>
             <a:endParaRPr lang="en-US" dirty="0"/>
           </a:p>
@@ -4273,7 +4309,7 @@
           <a:p>
             <a:r>
               <a:rPr lang="en-US" dirty="0" smtClean="0"/>
-              <a:t>Maybe you need to do something only if a certain condition is true. For example, only create a file if it doesn't exist yet:</a:t>
+              <a:t>Often you need to do the same thing multiple times, e.g. loop over all files (words):</a:t>
             </a:r>
             <a:br>
               <a:rPr lang="en-US" dirty="0" smtClean="0"/>
@@ -4283,21 +4319,35 @@
                 <a:latin typeface="Courier New"/>
                 <a:cs typeface="Courier New"/>
               </a:rPr>
-              <a:t>$ if [ ! -</a:t>
+              <a:t>$ </a:t>
             </a:r>
             <a:r>
               <a:rPr lang="en-US" dirty="0" err="1" smtClean="0">
                 <a:latin typeface="Courier New"/>
                 <a:cs typeface="Courier New"/>
               </a:rPr>
-              <a:t>e</a:t>
+              <a:t>file_list</a:t>
             </a:r>
             <a:r>
               <a:rPr lang="en-US" dirty="0" smtClean="0">
                 <a:latin typeface="Courier New"/>
                 <a:cs typeface="Courier New"/>
               </a:rPr>
-              <a:t> "filename" ]; then</a:t>
+              <a:t>=`</a:t>
+            </a:r>
+            <a:r>
+              <a:rPr lang="en-US" dirty="0" err="1" smtClean="0">
+                <a:latin typeface="Courier New"/>
+                <a:cs typeface="Courier New"/>
+              </a:rPr>
+              <a:t>ls</a:t>
+            </a:r>
+            <a:r>
+              <a:rPr lang="en-US" dirty="0" smtClean="0">
+                <a:latin typeface="Courier New"/>
+                <a:cs typeface="Courier New"/>
+              </a:rPr>
+              <a:t>`</a:t>
             </a:r>
             <a:br>
               <a:rPr lang="en-US" dirty="0" smtClean="0">
@@ -4310,7 +4360,21 @@
                 <a:latin typeface="Courier New"/>
                 <a:cs typeface="Courier New"/>
               </a:rPr>
-              <a:t>$ touch filename</a:t>
+              <a:t>$ for file in $</a:t>
+            </a:r>
+            <a:r>
+              <a:rPr lang="en-US" dirty="0" err="1" smtClean="0">
+                <a:latin typeface="Courier New"/>
+                <a:cs typeface="Courier New"/>
+              </a:rPr>
+              <a:t>file_list</a:t>
+            </a:r>
+            <a:r>
+              <a:rPr lang="en-US" dirty="0" smtClean="0">
+                <a:latin typeface="Courier New"/>
+                <a:cs typeface="Courier New"/>
+              </a:rPr>
+              <a:t>; do</a:t>
             </a:r>
             <a:br>
               <a:rPr lang="en-US" dirty="0" smtClean="0">
@@ -4323,19 +4387,28 @@
                 <a:latin typeface="Courier New"/>
                 <a:cs typeface="Courier New"/>
               </a:rPr>
-              <a:t>$ </a:t>
-            </a:r>
-            <a:r>
-              <a:rPr lang="en-US" dirty="0" err="1" smtClean="0">
-                <a:latin typeface="Courier New"/>
-                <a:cs typeface="Courier New"/>
-              </a:rPr>
-              <a:t>fi</a:t>
-            </a:r>
-            <a:endParaRPr lang="en-US" dirty="0">
-              <a:latin typeface="Courier New"/>
-              <a:cs typeface="Courier New"/>
-            </a:endParaRPr>
+              <a:t>$ echo $file</a:t>
+            </a:r>
+            <a:br>
+              <a:rPr lang="en-US" dirty="0" smtClean="0">
+                <a:latin typeface="Courier New"/>
+                <a:cs typeface="Courier New"/>
+              </a:rPr>
+            </a:br>
+            <a:r>
+              <a:rPr lang="en-US" dirty="0" smtClean="0">
+                <a:latin typeface="Courier New"/>
+                <a:cs typeface="Courier New"/>
+              </a:rPr>
+              <a:t>$ done</a:t>
+            </a:r>
+          </a:p>
+          <a:p>
+            <a:r>
+              <a:rPr lang="en-US" dirty="0" smtClean="0"/>
+              <a:t>Shell scripting also has loops with counter variables, "while" loops, etc.</a:t>
+            </a:r>
+            <a:endParaRPr lang="en-US" dirty="0"/>
           </a:p>
         </p:txBody>
       </p:sp>
@@ -4355,181 +4428,6 @@
 </file>
 
 <file path=ppt/slides/slide14.xml><?xml version="1.0" encoding="utf-8"?>
-<p:sld xmlns:a="http://schemas.openxmlformats.org/drawingml/2006/main" xmlns:r="http://schemas.openxmlformats.org/officeDocument/2006/relationships" xmlns:mc="http://schemas.openxmlformats.org/markup-compatibility/2006" xmlns:mv="urn:schemas-microsoft-com:mac:vml" xmlns:p="http://schemas.openxmlformats.org/presentationml/2006/main" mc:Ignorable="mv" mc:PreserveAttributes="mv:*">
-  <p:cSld>
-    <p:spTree>
-      <p:nvGrpSpPr>
-        <p:cNvPr id="1" name=""/>
-        <p:cNvGrpSpPr/>
-        <p:nvPr/>
-      </p:nvGrpSpPr>
-      <p:grpSpPr>
-        <a:xfrm>
-          <a:off x="0" y="0"/>
-          <a:ext cx="0" cy="0"/>
-          <a:chOff x="0" y="0"/>
-          <a:chExt cx="0" cy="0"/>
-        </a:xfrm>
-      </p:grpSpPr>
-      <p:sp>
-        <p:nvSpPr>
-          <p:cNvPr id="2" name="Title 1"/>
-          <p:cNvSpPr>
-            <a:spLocks noGrp="1"/>
-          </p:cNvSpPr>
-          <p:nvPr>
-            <p:ph type="title"/>
-          </p:nvPr>
-        </p:nvSpPr>
-        <p:spPr/>
-        <p:txBody>
-          <a:bodyPr/>
-          <a:lstStyle/>
-          <a:p>
-            <a:r>
-              <a:rPr lang="en-US" dirty="0" smtClean="0"/>
-              <a:t>Loops</a:t>
-            </a:r>
-            <a:endParaRPr lang="en-US" dirty="0"/>
-          </a:p>
-        </p:txBody>
-      </p:sp>
-      <p:sp>
-        <p:nvSpPr>
-          <p:cNvPr id="3" name="Content Placeholder 2"/>
-          <p:cNvSpPr>
-            <a:spLocks noGrp="1"/>
-          </p:cNvSpPr>
-          <p:nvPr>
-            <p:ph idx="1"/>
-          </p:nvPr>
-        </p:nvSpPr>
-        <p:spPr/>
-        <p:txBody>
-          <a:bodyPr/>
-          <a:lstStyle/>
-          <a:p>
-            <a:r>
-              <a:rPr lang="en-US" dirty="0" smtClean="0"/>
-              <a:t>Often you need to do the same thing multiple times, e.g. loop over all files (words):</a:t>
-            </a:r>
-            <a:br>
-              <a:rPr lang="en-US" dirty="0" smtClean="0"/>
-            </a:br>
-            <a:r>
-              <a:rPr lang="en-US" dirty="0" smtClean="0">
-                <a:latin typeface="Courier New"/>
-                <a:cs typeface="Courier New"/>
-              </a:rPr>
-              <a:t>$ </a:t>
-            </a:r>
-            <a:r>
-              <a:rPr lang="en-US" dirty="0" err="1" smtClean="0">
-                <a:latin typeface="Courier New"/>
-                <a:cs typeface="Courier New"/>
-              </a:rPr>
-              <a:t>file_list</a:t>
-            </a:r>
-            <a:r>
-              <a:rPr lang="en-US" dirty="0" smtClean="0">
-                <a:latin typeface="Courier New"/>
-                <a:cs typeface="Courier New"/>
-              </a:rPr>
-              <a:t>=`</a:t>
-            </a:r>
-            <a:r>
-              <a:rPr lang="en-US" dirty="0" err="1" smtClean="0">
-                <a:latin typeface="Courier New"/>
-                <a:cs typeface="Courier New"/>
-              </a:rPr>
-              <a:t>ls</a:t>
-            </a:r>
-            <a:r>
-              <a:rPr lang="en-US" dirty="0" smtClean="0">
-                <a:latin typeface="Courier New"/>
-                <a:cs typeface="Courier New"/>
-              </a:rPr>
-              <a:t>`</a:t>
-            </a:r>
-            <a:br>
-              <a:rPr lang="en-US" dirty="0" smtClean="0">
-                <a:latin typeface="Courier New"/>
-                <a:cs typeface="Courier New"/>
-              </a:rPr>
-            </a:br>
-            <a:r>
-              <a:rPr lang="en-US" dirty="0" smtClean="0">
-                <a:latin typeface="Courier New"/>
-                <a:cs typeface="Courier New"/>
-              </a:rPr>
-              <a:t>$ for file in $</a:t>
-            </a:r>
-            <a:r>
-              <a:rPr lang="en-US" dirty="0" err="1" smtClean="0">
-                <a:latin typeface="Courier New"/>
-                <a:cs typeface="Courier New"/>
-              </a:rPr>
-              <a:t>file_list</a:t>
-            </a:r>
-            <a:r>
-              <a:rPr lang="en-US" dirty="0" smtClean="0">
-                <a:latin typeface="Courier New"/>
-                <a:cs typeface="Courier New"/>
-              </a:rPr>
-              <a:t>; do</a:t>
-            </a:r>
-            <a:br>
-              <a:rPr lang="en-US" dirty="0" smtClean="0">
-                <a:latin typeface="Courier New"/>
-                <a:cs typeface="Courier New"/>
-              </a:rPr>
-            </a:br>
-            <a:r>
-              <a:rPr lang="en-US" dirty="0" smtClean="0">
-                <a:latin typeface="Courier New"/>
-                <a:cs typeface="Courier New"/>
-              </a:rPr>
-              <a:t>$ echo $file</a:t>
-            </a:r>
-            <a:br>
-              <a:rPr lang="en-US" dirty="0" smtClean="0">
-                <a:latin typeface="Courier New"/>
-                <a:cs typeface="Courier New"/>
-              </a:rPr>
-            </a:br>
-            <a:r>
-              <a:rPr lang="en-US" dirty="0" smtClean="0">
-                <a:latin typeface="Courier New"/>
-                <a:cs typeface="Courier New"/>
-              </a:rPr>
-              <a:t>$ done</a:t>
-            </a:r>
-          </a:p>
-          <a:p>
-            <a:r>
-              <a:rPr lang="en-US" dirty="0" smtClean="0"/>
-              <a:t>Shell scripting also has loops with counter variables, "while" loops, etc.</a:t>
-            </a:r>
-            <a:endParaRPr lang="en-US" dirty="0"/>
-          </a:p>
-        </p:txBody>
-      </p:sp>
-    </p:spTree>
-  </p:cSld>
-  <p:clrMapOvr>
-    <a:masterClrMapping/>
-  </p:clrMapOvr>
-  <p:timing>
-    <p:tnLst>
-      <p:par>
-        <p:cTn id="1" dur="indefinite" restart="never" nodeType="tmRoot"/>
-      </p:par>
-    </p:tnLst>
-  </p:timing>
-</p:sld>
-</file>
-
-<file path=ppt/slides/slide15.xml><?xml version="1.0" encoding="utf-8"?>
 <p:sld xmlns:a="http://schemas.openxmlformats.org/drawingml/2006/main" xmlns:r="http://schemas.openxmlformats.org/officeDocument/2006/relationships" xmlns:mc="http://schemas.openxmlformats.org/markup-compatibility/2006" xmlns:mv="urn:schemas-microsoft-com:mac:vml" xmlns:p="http://schemas.openxmlformats.org/presentationml/2006/main" mc:Ignorable="mv" mc:PreserveAttributes="mv:*">
   <p:cSld>
     <p:spTree>
@@ -5414,7 +5312,7 @@
 </p:sld>
 </file>
 
-<file path=ppt/slides/slide16.xml><?xml version="1.0" encoding="utf-8"?>
+<file path=ppt/slides/slide15.xml><?xml version="1.0" encoding="utf-8"?>
 <p:sld xmlns:a="http://schemas.openxmlformats.org/drawingml/2006/main" xmlns:r="http://schemas.openxmlformats.org/officeDocument/2006/relationships" xmlns:mc="http://schemas.openxmlformats.org/markup-compatibility/2006" xmlns:mv="urn:schemas-microsoft-com:mac:vml" xmlns:p="http://schemas.openxmlformats.org/presentationml/2006/main" mc:Ignorable="mv" mc:PreserveAttributes="mv:*">
   <p:cSld>
     <p:spTree>
@@ -5467,7 +5365,7 @@
         <p:spPr/>
         <p:txBody>
           <a:bodyPr>
-            <a:normAutofit/>
+            <a:normAutofit fontScale="92500" lnSpcReduction="10000"/>
           </a:bodyPr>
           <a:lstStyle/>
           <a:p>
@@ -5534,25 +5432,37 @@
               <a:rPr lang="en-US" sz="2800" dirty="0" smtClean="0"/>
               <a:t> dies (i.e. invalid file) the exit code $? should be non-zero. Use this.</a:t>
             </a:r>
+            <a:endParaRPr lang="en-US" sz="2800" dirty="0" smtClean="0"/>
           </a:p>
           <a:p>
             <a:r>
               <a:rPr lang="en-US" sz="2800" dirty="0" smtClean="0"/>
-              <a:t>From the file names you can see which should not validate: error_</a:t>
-            </a:r>
+              <a:t>Test by changing it to validate all files in the directory (even if not </a:t>
+            </a:r>
+            <a:r>
+              <a:rPr lang="en-US" sz="2800" dirty="0" err="1" smtClean="0"/>
+              <a:t>fastq</a:t>
+            </a:r>
+            <a:r>
+              <a:rPr lang="en-US" sz="2800" smtClean="0"/>
+              <a:t>)</a:t>
+            </a:r>
+            <a:endParaRPr lang="en-US" sz="2800" smtClean="0"/>
+          </a:p>
+          <a:p>
             <a:r>
               <a:rPr lang="en-US" sz="2800" dirty="0" smtClean="0"/>
-              <a:t>*</a:t>
-            </a:r>
-          </a:p>
-          <a:p>
+              <a:t>From </a:t>
+            </a:r>
             <a:r>
               <a:rPr lang="en-US" sz="2800" dirty="0" smtClean="0"/>
-              <a:t>Bash manual: </a:t>
-            </a:r>
+              <a:t>the file names you can see which should not validate: error_*</a:t>
+            </a:r>
+          </a:p>
+          <a:p>
             <a:r>
               <a:rPr lang="en-US" sz="2800" dirty="0" smtClean="0"/>
-              <a:t>http://</a:t>
+              <a:t>Bash manual: http://</a:t>
             </a:r>
             <a:r>
               <a:rPr lang="en-US" sz="2800" dirty="0" err="1" smtClean="0"/>
@@ -5562,7 +5472,6 @@
               <a:rPr lang="en-US" sz="2800" dirty="0" smtClean="0"/>
               <a:t>/LDP/abs/html/</a:t>
             </a:r>
-            <a:endParaRPr lang="en-US" sz="2800" dirty="0" smtClean="0"/>
           </a:p>
           <a:p>
             <a:endParaRPr lang="en-US" sz="2800" dirty="0"/>
@@ -5951,7 +5860,9 @@
         </p:nvSpPr>
         <p:spPr/>
         <p:txBody>
-          <a:bodyPr/>
+          <a:bodyPr>
+            <a:normAutofit fontScale="92500" lnSpcReduction="10000"/>
+          </a:bodyPr>
           <a:lstStyle/>
           <a:p>
             <a:r>
@@ -5968,7 +5879,17 @@
           <a:p>
             <a:r>
               <a:rPr lang="en-US" dirty="0" smtClean="0"/>
-              <a:t>The shell is always there, even if other tools are not.</a:t>
+              <a:t>The shell is always there, even if other tools are not</a:t>
+            </a:r>
+            <a:r>
+              <a:rPr lang="en-US" dirty="0" smtClean="0"/>
+              <a:t>.</a:t>
+            </a:r>
+          </a:p>
+          <a:p>
+            <a:r>
+              <a:rPr lang="en-US" dirty="0" smtClean="0"/>
+              <a:t>Some Grid architectures work best/easiest with shell script job submission files.</a:t>
             </a:r>
             <a:endParaRPr lang="en-US" dirty="0"/>
           </a:p>
@@ -6700,7 +6621,7 @@
           <a:p>
             <a:r>
               <a:rPr lang="en-US" dirty="0" smtClean="0"/>
-              <a:t>Another example</a:t>
+              <a:t>Comments</a:t>
             </a:r>
             <a:endParaRPr lang="en-US" dirty="0"/>
           </a:p>
@@ -6723,46 +6644,30 @@
           <a:p>
             <a:r>
               <a:rPr lang="en-US" dirty="0" smtClean="0"/>
-              <a:t>Once, when I was installing </a:t>
-            </a:r>
-            <a:r>
-              <a:rPr lang="en-US" dirty="0" err="1" smtClean="0"/>
-              <a:t>LWP::UserAgent</a:t>
-            </a:r>
+              <a:t>It is good practice to explain all but the most trivial source code, both to yourself and to others.</a:t>
+            </a:r>
+          </a:p>
+          <a:p>
             <a:r>
               <a:rPr lang="en-US" dirty="0" smtClean="0"/>
-              <a:t>, I accidentally the whole package, including HEAD (=fetches HTTP header)</a:t>
+              <a:t>Comments are the way to explain source code from a developer point of view.</a:t>
             </a:r>
           </a:p>
           <a:p>
             <a:r>
               <a:rPr lang="en-US" dirty="0" smtClean="0"/>
-              <a:t>This overwrote the essential, system built-in </a:t>
-            </a:r>
-            <a:r>
-              <a:rPr lang="en-US" dirty="0" smtClean="0">
-                <a:latin typeface="Courier New"/>
-                <a:cs typeface="Courier New"/>
-              </a:rPr>
-              <a:t>head(1)</a:t>
+              <a:t>In shell (and many other) scripting languages, anything followed by </a:t>
+            </a:r>
+            <a:r>
+              <a:rPr lang="en-US" b="1" dirty="0" smtClean="0">
+                <a:latin typeface="Courier New"/>
+                <a:cs typeface="Courier New"/>
+              </a:rPr>
+              <a:t>#</a:t>
             </a:r>
             <a:r>
               <a:rPr lang="en-US" dirty="0" smtClean="0"/>
-              <a:t> utility on </a:t>
-            </a:r>
-            <a:r>
-              <a:rPr lang="en-US" dirty="0" err="1" smtClean="0"/>
-              <a:t>MacOSX</a:t>
-            </a:r>
-            <a:r>
-              <a:rPr lang="en-US" dirty="0" smtClean="0"/>
-              <a:t>.</a:t>
-            </a:r>
-          </a:p>
-          <a:p>
-            <a:r>
-              <a:rPr lang="en-US" dirty="0" smtClean="0"/>
-              <a:t>With some simple scripting I could re-create the functionality and recover from the damage.</a:t>
+              <a:t> is a comment</a:t>
             </a:r>
             <a:endParaRPr lang="en-US" dirty="0"/>
           </a:p>

</xml_diff>